<commit_message>
removed for new version
</commit_message>
<xml_diff>
--- a/media/nob-intro-stanford-hackathon.pptx
+++ b/media/nob-intro-stanford-hackathon.pptx
@@ -400,11 +400,11 @@
         </c:dLbls>
         <c:marker val="1"/>
         <c:smooth val="0"/>
-        <c:axId val="317575256"/>
-        <c:axId val="317570944"/>
+        <c:axId val="352071056"/>
+        <c:axId val="352072624"/>
       </c:lineChart>
       <c:catAx>
-        <c:axId val="317575256"/>
+        <c:axId val="352071056"/>
         <c:scaling>
           <c:orientation val="minMax"/>
         </c:scaling>
@@ -424,7 +424,7 @@
             <a:endParaRPr lang="en-US"/>
           </a:p>
         </c:txPr>
-        <c:crossAx val="317570944"/>
+        <c:crossAx val="352072624"/>
         <c:crosses val="autoZero"/>
         <c:auto val="1"/>
         <c:lblAlgn val="ctr"/>
@@ -433,7 +433,7 @@
         <c:noMultiLvlLbl val="0"/>
       </c:catAx>
       <c:valAx>
-        <c:axId val="317570944"/>
+        <c:axId val="352072624"/>
         <c:scaling>
           <c:orientation val="minMax"/>
         </c:scaling>
@@ -454,7 +454,7 @@
             <a:endParaRPr lang="en-US"/>
           </a:p>
         </c:txPr>
-        <c:crossAx val="317575256"/>
+        <c:crossAx val="352071056"/>
         <c:crosses val="autoZero"/>
         <c:crossBetween val="between"/>
         <c:majorUnit val="200000"/>
@@ -462,6 +462,7 @@
     </c:plotArea>
     <c:legend>
       <c:legendPos val="t"/>
+      <c:layout/>
       <c:overlay val="0"/>
       <c:txPr>
         <a:bodyPr/>
@@ -757,11 +758,11 @@
         </c:dLbls>
         <c:marker val="1"/>
         <c:smooth val="0"/>
-        <c:axId val="317579960"/>
-        <c:axId val="317570160"/>
+        <c:axId val="352067136"/>
+        <c:axId val="352071448"/>
       </c:lineChart>
       <c:catAx>
-        <c:axId val="317579960"/>
+        <c:axId val="352067136"/>
         <c:scaling>
           <c:orientation val="minMax"/>
         </c:scaling>
@@ -781,7 +782,7 @@
             <a:endParaRPr lang="en-US"/>
           </a:p>
         </c:txPr>
-        <c:crossAx val="317570160"/>
+        <c:crossAx val="352071448"/>
         <c:crosses val="autoZero"/>
         <c:auto val="1"/>
         <c:lblAlgn val="ctr"/>
@@ -790,7 +791,7 @@
         <c:noMultiLvlLbl val="0"/>
       </c:catAx>
       <c:valAx>
-        <c:axId val="317570160"/>
+        <c:axId val="352071448"/>
         <c:scaling>
           <c:orientation val="minMax"/>
         </c:scaling>
@@ -811,7 +812,7 @@
             <a:endParaRPr lang="en-US"/>
           </a:p>
         </c:txPr>
-        <c:crossAx val="317579960"/>
+        <c:crossAx val="352067136"/>
         <c:crosses val="autoZero"/>
         <c:crossBetween val="between"/>
         <c:majorUnit val="200000"/>
@@ -819,6 +820,7 @@
     </c:plotArea>
     <c:legend>
       <c:legendPos val="t"/>
+      <c:layout/>
       <c:overlay val="0"/>
       <c:txPr>
         <a:bodyPr/>
@@ -4570,6 +4572,13 @@
   <p:clrMapOvr>
     <a:masterClrMapping/>
   </p:clrMapOvr>
+  <p:timing>
+    <p:tnLst>
+      <p:par>
+        <p:cTn id="1" dur="indefinite" restart="never" nodeType="tmRoot"/>
+      </p:par>
+    </p:tnLst>
+  </p:timing>
 </p:sld>
 </file>
 
@@ -4714,6 +4723,13 @@
   <p:clrMapOvr>
     <a:masterClrMapping/>
   </p:clrMapOvr>
+  <p:timing>
+    <p:tnLst>
+      <p:par>
+        <p:cTn id="1" dur="indefinite" restart="never" nodeType="tmRoot"/>
+      </p:par>
+    </p:tnLst>
+  </p:timing>
 </p:sld>
 </file>
 
@@ -4836,6 +4852,13 @@
   <p:clrMapOvr>
     <a:masterClrMapping/>
   </p:clrMapOvr>
+  <p:timing>
+    <p:tnLst>
+      <p:par>
+        <p:cTn id="1" dur="indefinite" restart="never" nodeType="tmRoot"/>
+      </p:par>
+    </p:tnLst>
+  </p:timing>
 </p:sld>
 </file>
 
@@ -6063,6 +6086,365 @@
           </a:extLst>
         </p:spPr>
       </p:pic>
+      <p:pic>
+        <p:nvPicPr>
+          <p:cNvPr id="1028" name="Picture 4" descr="https://lh5.googleusercontent.com/-QY3iJXxpxXU/AAAAAAAAAAI/AAAAAAAAAE4/f822d1asIGk/s120-c/photo.jpg"/>
+          <p:cNvPicPr>
+            <a:picLocks noChangeAspect="1" noChangeArrowheads="1"/>
+          </p:cNvPicPr>
+          <p:nvPr/>
+        </p:nvPicPr>
+        <p:blipFill>
+          <a:blip r:embed="rId4">
+            <a:extLst>
+              <a:ext uri="{28A0092B-C50C-407E-A947-70E740481C1C}">
+                <a14:useLocalDpi xmlns:a14="http://schemas.microsoft.com/office/drawing/2010/main" val="0"/>
+              </a:ext>
+            </a:extLst>
+          </a:blip>
+          <a:srcRect/>
+          <a:stretch>
+            <a:fillRect/>
+          </a:stretch>
+        </p:blipFill>
+        <p:spPr bwMode="auto">
+          <a:xfrm>
+            <a:off x="8271710" y="3377542"/>
+            <a:ext cx="1143000" cy="1143001"/>
+          </a:xfrm>
+          <a:prstGeom prst="rect">
+            <a:avLst/>
+          </a:prstGeom>
+          <a:noFill/>
+          <a:extLst>
+            <a:ext uri="{909E8E84-426E-40DD-AFC4-6F175D3DCCD1}">
+              <a14:hiddenFill xmlns:a14="http://schemas.microsoft.com/office/drawing/2010/main">
+                <a:solidFill>
+                  <a:srgbClr val="FFFFFF"/>
+                </a:solidFill>
+              </a14:hiddenFill>
+            </a:ext>
+          </a:extLst>
+        </p:spPr>
+      </p:pic>
+      <p:sp>
+        <p:nvSpPr>
+          <p:cNvPr id="5" name="AutoShape 6" descr="data:image/jpeg;base64,/9j/4AAQSkZJRgABAQAAAQABAAD/2wCEAAkGBwgHBgkIBwgKCgkLDRYPDQwMDRsUFRAWIB0iIiAdHx8kKDQsJCYxJx8fLT0tMTU3Ojo6Iys/RD84QzQ5OjcBCgoKDQwNGg8PGjclHyU3Nzc3Nzc3Nzc3Nzc3Nzc3Nzc3Nzc3Nzc3Nzc3Nzc3Nzc3Nzc3Nzc3Nzc3Nzc3Nzc3N//AABEIAKAAoAMBEQACEQEDEQH/xAAbAAACAwEBAQAAAAAAAAAAAAAABgQFBwECA//EAEoQAAEDAgMDBQkMCQMFAAAAAAECAwQABQYRIRIxQQcTNlGxFBYiMlZhcXSBNVJUcpGTlJWywtHSFSMkQmKSocHwFzPhJlNkgqL/xAAbAQEAAgMBAQAAAAAAAAAAAAAAAQUCAwQGB//EADcRAAIBAwIDAwoGAgMBAAAAAAABAgMEEQUhEjFRE0FxFBUyMzRCU2GBsSJSkaHR4QbBJGPwI//aAAwDAQACEQMRAD8A3GgCgCgCgCgOEgDWgFe9Y2gWy5fo9qNLnSUp2nUQ29st/GrFyw8HbRsalWHG2kvm8EPv/T5OX36Iajj+Rt82v4kf1Dv/AE+Tl9+iGnH8h5tfxI/qHf8Ao8nL59ENOP5Dza/iR/U73/J8nL59FNOP5Eebv+yP6nO/9Pk5fPohpx/Inza/iR/UO/8AT5OXz6IacfyHm1/Ej+p6Z5QYHdbDM+3XG3oeVsJels7CM+rOnaIh6bPDcJKWOg4pIy/CsyuPVAFAFAFAFAFAFAFAFAcJGW6gE3E2I5b8/vdwzk5dVjN58+JET1k9e7SsJS3wjvt7aKh29faH3/oSbxiKLgxk2bC6w7O2tqbcFgKKl9Q/r6PPULbZFrRtZXj7ausR7olP/qRin4en5lNN+p0+arXoA5SMU/D0/Mppv1Hmq16F7hvF99nsybjdb33NAhrbDgRGC1ulROSR1bt566Lib5lXqkbOwgm4Zbz3kiPie+3S3OKs09lie28+67EdO0pbZyUkIJGuyAoVnUjJcil0e5tasnC4WW+QtDlIxRlpcE/MprDfqev81WvQP9SMUfD0/Mppv1I81Wv5Sxs2OzdVOWvGWxJt0kBPO7ISWFcFadvCj+Zorad2K7S12khusl1lYSuDFhvr5kQH9LdcDuI4IUfk+WkW1syurUYXUHWorElzRoCTpWwqT1QkKAKAKAKAKAKA5nvoBNxPiOXIuHe7hoBy5ODJ9/eiInrP8XmrCUu5FhbW0Iw7e49Hp1EbEN7iYUgOYfw07zktefd9wz8Mq4gHr1Ouen9ahYSwi0tred1NV662XoozzIDQDKmNsF0dqQAoB7w93TZcGPXO3Nl56e6ph9WW0iOhOeWY6ySdTurKkk22zx/+S3NSLVOK2X+zxgx1p9yVZVpU05cm+ZalNDNbRyOnxTxrbUjlHmtIuY0K6bjkSpDSmH3GV7O02soOzuzByrnR9UjLiSZ4qSQoB0wjiWK5BVhvEwDlpe0bdUdY6uBB6uyo5bdxWXlpLj7ehtNd3UebFdpWFZzOH8QO85Cd0t1wVuWPeKPXUp8OzKivRhcwdait/eX+x/CszlWZVHqhIUAUAUAUAUBUYskOxcN3N+O4W3W46lIWN4OVRLkbraKnWjGXJsy693A4TwlbItnbLUq7sF6TNKv1h3Z6/wDt7K1rZJIvaFLyu4lKryg8JdxnA0qfkXZ2pAUBYYftxu17hwP1gS+8lKlISSQniR7ONR8jTcVeypSn0GLEdykMvOWmIG4cCMtSEsRV+CrzrI8Y10U4pHyzUL2vcVW6jKm3LU3MZWmWYZSrMSACebI46a1mzhpP8S3wWXKFDAkw7mwll1qU0A7Kj/7brw8bIfunzGuWW0j6Zodz2tvwuWWvsKNC7CgCgNF5PJvfDDkYWvTXdMIMlxhxR8JnLgPl0qMZ2ZSahT8nmrmk8POH8x85LpT8zBkF2U6t1wbSdpZzOQOQqabbjllVqcYxupKKG2szhCgCgCgCgCgKPGvRO7eqr7KxlyOmz9oh4oyflJ9yMJ+oH7lYLu8C/wBM9bW8f5EWsi3ChByhJpWC8KXmKxJU/GSYdzihHPMPpS62k6ggHr4ikW08nm9WrULqn2Sk00fa+YegWKzzO6IHNZthMWS7ICnHXCeCE6JAGfXWyMpSZ5W6tLWhb7PMigwnbodynuR5aStfN/s7AeDXPLz3bWWmlbJtpbFdY0aVarw1ZYGW64OuyrQ7arNbObafeS685KmJWrNO4JAGQ36mueUpS5o9dpcLSxm58befkZtdrdJtE92DMSlL7WiglW0B7ahHrKNWNaCnDkyHUmwKAeeR7pS76m52io94qtY9QvE0Pkk6DwvjL+0aUfQRT6r7VL6fYcq2FcFAFAFAFAFAUeNuid29VX2VjLkdNn7RDxRk3KT7kYT9QP3KwXd4F/pnrK3j/IjVkW4UIJFugSLpOZgw0bb7ytlA4en0VDMKlWNKDnLkjQLzilpDsOHZ4seU9DZTGTMW3tlZG/YTuyz41ujT23Pm1zq9RzlGjybyLd8euj04m9Kf7qQNzw2SkcABwHorYsdxT1pVZSzU5kFCVFaQgKKiRsgb86yNKz3DS1d79bVNJvdsdmNMqCm+7GVBSCOKXAM+2tcowZa0L28tuecFfjJtm+mTiW2PFTe2hEqMsZLjqIyB00KTlvrRKLiz2eh6nTrw7DGGhQoeiCmAPPI90qd9TX2io94qtY9QvE0Pkk6DwvjL+0aUfQRT6r7VL6fYcq2FcFAFAFAFAFAUeNuid29VX2VjLkdNn7RDxRk3KT7kYT9QP3KwXd4F/pnrK3j/ACI1ZFuFCC6wtd49olyFy23VMyI62FLYUA43tZeEnPjpUN4eTh1Gzld0Ozi8GlRTY8JmBMQWWkPR+eWHwXZS8xoE8EjrPsrb+KT2PDyhaWKknvLuFrGWMu+NCGEW9tllte0hxZ2nT7eA13a1tjHBUXV52ywkKY9lZHCNtixvJtsJiHLZcfYYXttlqQptfoUddpO/StcoZ5FnbalKkuFrJf3yNExVa1XN/EjkO1uLClxjHCgyocFEefr660TWHuz1Gl3sMJ0aacvHcV+9bCHHGrXzH/Na1KP5i68tvPgh3r4P8tWvmP8Amp4l+YeW3fwS7wlHwnhq5Knt4rYkFTKmtgt7O+ilHPM5rud3cwUXSaGnkkP/AERCy9859o1lSWII4dV9ql9BzrYVwUAUAUAUAUBR426J3b1VfZWMuR02ftEPFGTcpPuRhP1A/crBd3gX+mesreP8iNWRbhnkM8s6hkDoW4GFGoyDEZl3VbCH1vydW2doZgJRxOXE1shTTWWeG1jXayqOlS5Hwbtd/wAQyFSRDlyluHNT60kJPtOQyrdlRPLdlXrSzjJEutomWlbSZiUZOpKm1trC0qHHIjqqYyUuRjXt6lB4msENlvnXm2922tKc/SalmqMeJpDdeMDhiUWLLc409xB2XI6nEodSr0Z61qjURa1tIrQipwTaPeGLFiGzX6K69a3xHcWG5A2QtCkHQ7Xo31MmmsGu2pXFCqng0dU3Cwe5svWnnNrZKfAzz3ZVpzE9H2dylnf9yzFrt/wGL8yn8KnCNPa1PzP9Q/RVuO+BF+ZT+FMIdpPqyQww1HQG2G0NoG5KE5CpMW23ln1oQFAFAFAFAFAUeNuid29VX2VjLkdNn7RDxRk3KT7kYT9QP3KwXd4F/pnrK3j/ACI1ZFuHA9mW+oIGGNjW+xIrMZiU2lLKAhDnNJKwkbhtEUy+pwS022nNzlHcf7XfmcR2+Kb3h6Q5DabSHp8t0Ja0GqtfG16qj0njBS3VPyNymqqXyQj4hurdzlpERhEaDHBbisIGQSgnPP0nfXXCKitjxN7dzuajnJ5KsdeZBzGRHA1ljJyJtPKH+zXbDd7aUq+WmAq7nLadfISmRlpntHcr01zypLng9NZaxPhVOU3HBHkYlw7ZJr0V3BrsGQjRaEOhBPybxWhYz6J6aNncVoKUa2V9T4Rb9ga5uCDLw6m3tPAp7pCh+rz46bvTWWE9mjOdrf0lxxqZx3DRZrzMwlOZsmInufgO6QLn+6oe9V/TWpTcXhnDXoQuoutRX4lziaAlQIGorYVR6oAoAoAoAoAoAoCjxr0Tu3qq+ysZcjps/aIeKMm5SNbThMf+Ar7lYd68C/0xf/St4iNpwNZFuFCBkwSu1tTJUi5uxm3W2f2UyUFTfOZ7yBvyFRtncrdUhdTpKNvzZdrbt9+ntRZOLnpk99WwwkRFc2lXUddB6BWxVYp4PH1tAu3CU6suQrvtll5bRIJQpSSRuORyzroTPMSXC8HgHZO1ltHqzoyF8xwu7OH48Jq5RrFJetroG1IjTTtMq4pWkp0+XWuedSUOZ6qx0q0vo5hPEun/AJitie9xrwuGmJGdaahscylTzu2tYzzGZA4bhWDy3k9hpti7OnwcWSk4emhYjphPFUbuI4exM33RaHdEOE5qjHhl5uyseW3cVV3ZS4+3t9p/cdbTdpODZTFqvcnumzyNIFyz0SOCV+zj/bdKlwvDKurRjeRdWksTXOP+0aGFggEbjWwqT1QBQBQBQBQBQEafCZnw34kkFTL6ChYByzBqGsmUJuElJc0ZjcIDdvQ3hfFai9a3TlbLrlkphXBKjw/z2a2sbMuqdTtM3Nv6XvR6/MzzEVim4fuSoc9Op1bdSPBdT74fhwonjZl3bXMLimpwKveNNayN41WuwxIVsj3u+KLzDySY0NoH9aeG2vckebfSMeI87q+tq0zTprcsIWI7gp1qHh+2w4q81FLUVjbUSeOasyK3cEUeOqareXMtmLj7bjLq2n0qS4lRCgreDxraiokmnueB7KEFxHTe8PBu5tMSIrL6Rk6pPgOpOoCuBHprF8L2OqHb0MTWxPtX6OxHORBfw/HZLmq5MFRaLI4rIOYyHsrVKlFbl9Za/eOoo8xIktpakOtocDiULUkLG5QByz9takfQovMUz5j0VJJofJhNcu3dWG7kEyLaqOpxKF72yD+6eG+oS90ptTpqjw3FPaWR75KHFu4JglxalEFaRmc8gDoKUnmCKnU0ldSwOFbDgCgCgCgCgCgCgIV2tkS7QHYc9hLzDgyUk9o6jUNJrDM6dSdOXHDmZtcYKbchOGMWuF61PEi23QgBTCveq6v89mvGNmXNOq6j8ot9pe9HqIN7w1dLHczElxHJASQpKmUqKXU+YgabqhvGzLijeUq8OKLwaDFlQb7EcZTbZcW1xClxTUspjRmf5QVLO/qrKE2+SPKX1ioZndVU0+hFlYvhWaMtjDxbW6sZBbUcMtN+fIkqWfSchW9Qecspa9/Qpw4beIhuKUtaluKKlqO0VHeSd5ralgpJPLyzyRtDLrzoyE8DmzMul1can4dmBNx5pLcy3PKBQ+EjIKSk6KBG8b65pwallHtdLv7WvR7C5X1KjEky8RbY5GVh9NljSVgPrbQoc6RuSSeG/SsHJy5l3p2nWNCpxUZJsUKkuwoB55HulL3qa+0VHvFVrHqF4mh8knQeF8Zf2jSj6CKfVfapfT7DlWwrgoAoAoAoAoDmdAGYoCHdrdFusB2FNaDrDoyUk9o6jUNJ7M2UqkqU1ODw0KUPC2KLfHREgYpQmK14LSXIm0oJ4AnOsOGXczvld2tR8U6W76MlKw/e5MNUa83C33NO2HEF+MtIQQOpKtfbWUeJd5yV/I62PwPHj/RmuNZER27IZgpi7EdlLS3Irewha9Soge3LfW+Ca5nmL+pTlUxTWyF6thwhQAQDvoBsw2ibIsN3caddmqWyYzdu53PazHjkE7k8MhWiry2PQ6FvXUpzxgQVJUklKklKk+CQRkQRvFaU8n0rKe6OVIHnke6Uu+pr7RUe8VWseoXiaHySdB4Xxl/aNKPoIp9V9ql9PsOVbCuCgCgCgCgCgK3EM5y22SdNYSlTjDKnEhW4kVD2RtoU1Uqxg+9itb7rjm4QWJkeDaS0+gLRtOqByNYZn0O6pSsYScXKW3y/skd0Y/8AgFn+eVU5l0MOGw/NL9P7OGTj/wCAWf55VMz6BxsPzS/T+xTxrjSbI2rTEeQlLY2JL7WgdX+8E9SR/Wt8Y9TzF/eZk4U+QiaDIDdu2a2cirSbY5r5PZyMOG6LfSmQlBcVEKNQnfvz8bKsOPc7vIJdlx53KDD9mfv8/uOIttDhQVguZgED0Vk3g5aFCVaXCic7gjEbZUDbVqy4pUnLtqONG12NfOMFVMhT7PKQmWy9EkDVBPgn0gipTyapU50nusMk4oCbrZ4t/CUiWHO5p2yMtteWaFn0gEHz5VzTXCz33+N6g69J05vdCsRlUHqB55HulLvqa+0VHvFTrHqF4mh8knQeF8Zf2jSj6CKfVfapfT7DlWwrgoAoAoAoAoCjxr0Uu3qq+ysZcjos/aIeKMmx+4tFjwlzbi05wFZ7KiM/ErX3rwPQaek6tbPUSu6H/wDvu/zmssIteCPQZ8IuPRLddb0pxwuMITHjZqJycczGfsAPy1MI5Z5z/I7nsbdQjzZ7NlhQY7Ll9uiYLj6Q4iMiOp1wIO4qAI2c63Oqo7HlLLQri7jxx2Q0svwLThq0z7A0EiVcEMuSJTaVOKTtZE/w+ytEpt8i9tNKpUakqU1lpZ+pos2VEehSW0yGVlTK/BSsEnwTWzKOOcJKDbRkvJUtKMTJWtQCRGWSSdAMhW2fIotO9fg0HHsyK5g+6pbksqUpggBLgJNaJctj1djCauYZT5ibjC/OWmNYI70dqbAftqS9Gd0zI4pVvSrz1gpNYx0Oujp9K8jVjPuYtXC62NrD02FalznHJzjS1NSUjJjYJPjDxjrlWU5cROlaJUsa/G3+EU6HpFyHnke6Uu+pr7RUe8VWseoXiaHySdB4Xxl/aNKPoIp9V9ql9PsOVbCuCgCgCgCgCgKPGvRS7eqr7KxlyOiz9oh4oyTlC9w8JeoK+5WvvXgeh071tbx/kSKzLYn2m93OzF39GS1x+dy2wACFZbtCD11H1OetbUa+O0jnBGlypE2SuTLeW8+4c1OLOZJotjbCEYR4YrCHSzYrw83haJZr7bJkvmHFLHNlITmSf4geNRhY3RV1rG4dw6tKSWS3wzc8HSbkpuz2ORFmdzulDrhGQGwc/wB40jGKeyOHUaN5C2k6s00UeAiwLlIVNaLsbuB3nGwdVJ2RmK6ano7njdJz5WlF4Z9xe+TzIZYam/zJ/PXJwQ6Hv/JdQ+Kv/fQq8dYig4gft/6NjPx2Ycfmdl7Lr0yyJrPvyjosbWpbqXG8tsV6k78BQDzyPdKXfU19oqPeKrWPULxND5JOg8L4y/tGlH0EU+q+1S+n2HKthXBQBQBQBQBQFHjXopdvVV9lYy5HRZ+0Q8TJOUL3Bwkrh3CoZ/yVr6HodO9bW8f5EjdWZbBQgKAKAZuTzTEC1HQJhvn/AODTvRV608WciZgg7V2db/edhvoQOs7BrfU9E+d6W0rqLYmDcPPXOuR9ZfM7UkBQBQDzyPdKH/U3P7UXpFVrHqF4mh8knQiF8Zf2jUUfQRTap7VL6fYcq2FeFAFAFAFAFAR5sRmdFeiyUBbLyShaTxBoZQk4SUovDRmdwgN2NCcOYlUqRYZCv2CeR4URXBKj/etXovD5FzTqOs+3t9prmupnmJsPy8O3HuSXktKhtNPpHgvJ6x/cVPfgurW5jcw4o/UqKk6QoCbZrW/eLi1CjFKVLzKlr8VCRqVHzACoNNevChTdSfJDGiXaLKxJYsiH5Mp5osuTn1BI2Tv2EDr6ya2xpb5PAap/kE7uLpxWEVtqnOWu5RpzAzWw4FhHA9Y9ozFb2so89SqOnNSR97/h0FMi72JaZdrUsuKSg5ORQdclp4AddcfC4vc+naZq1G6hGOfxC11ULgKkEu022Xd57UK3tl19w6AbgOsngKhmurVhSg5zeyNKt0BVvU5hfCK0LuS0j9KXXLwWR70f10/wRv6KKOpU7T/k3KxH3Y9TR7BaI9jtjNvh58y0N6jqo8Sa2JJLCKavWlXqOpLmyyqTUFAFAFAFAFAFARLnbotyguxJrSXWXRkpKuNGk+ZnTqSpyUovdGa3CAiztpw5ihanrE+SLfcj48VXBJO4enzfJq5bMuadTtn29Daa5x6iDf8AC90stxVDdjuPADaQ8y0VJcTwIy7Kcti4oXlKvDjTx8jljw1NuswsuNuxGUILjz7rKskJHm4nzVK3exjd31K2p8beS7UIlshyotht9ycclI5t2XLRkoI4pQlI0z8+tbIU0nls8NqmtV7yHZqOF4FN3DL+CP8AzKvwroyed7OfRh3DL+CSPmVfhTI7KfRkq1qutqmolwmZCHUAj/ZUQoHeCMtR5qh4ZspdrSlxRTyWTdng4iWY7dqftFwUklpbKFGO6oDPIpOqN3A1zypY3TPXad/kVfiVOstmLNvsN1uExuJHgPh5w5DbQUgdZJI0FYZyetqXNGEOKUlg0S3QVW9SsM4TWHZ7oBud1y0ZHvU/2FR34RT1ava/8m59H3Y9TQsO2GFYLY3Bt6ClA1Ws+M4r3yvPWxR4VgqLivOvNzmW1SaAoAoAoAoAoAoAoAoCJc4EW5QnIc1lDrDoyUlQ/wA1o1nZmdOpKnJSg8MUYmE8SQGExbfi3mojeYZbchBZQngM9rXKtXBNcmd87y3m+KdLfxPt3vYv8skfV4/NThn1MfKLT4X7ne9/GHlij6vH5qcM+o8ptfhfuHe/i/yxR9Xp/NThqdR5Ra/C/cO9/F/lij6vT+anDU6jym1+F+4d7+L/ACyR9Xp/NThqdR5Ra/C/cO97F/lij6uH5qcNTqPKbX4X7nzfw3i11pTa8ZZJWNk7MAA5enapwz6kxubWLz2X7jBh2xQrBbkwoKMkjVaz4ziuKjWxLC2OSvXnXm5zLYaVJpCgCgCgCgP/2Q=="/>
+          <p:cNvSpPr>
+            <a:spLocks noChangeAspect="1" noChangeArrowheads="1"/>
+          </p:cNvSpPr>
+          <p:nvPr/>
+        </p:nvSpPr>
+        <p:spPr bwMode="auto">
+          <a:xfrm>
+            <a:off x="225538" y="714293"/>
+            <a:ext cx="192252" cy="192253"/>
+          </a:xfrm>
+          <a:prstGeom prst="rect">
+            <a:avLst/>
+          </a:prstGeom>
+          <a:noFill/>
+          <a:extLst>
+            <a:ext uri="{909E8E84-426E-40DD-AFC4-6F175D3DCCD1}">
+              <a14:hiddenFill xmlns:a14="http://schemas.microsoft.com/office/drawing/2010/main">
+                <a:solidFill>
+                  <a:srgbClr val="FFFFFF"/>
+                </a:solidFill>
+              </a14:hiddenFill>
+            </a:ext>
+          </a:extLst>
+        </p:spPr>
+        <p:txBody>
+          <a:bodyPr vert="horz" wrap="square" lIns="91440" tIns="45720" rIns="91440" bIns="45720" numCol="1" anchor="t" anchorCtr="0" compatLnSpc="1">
+            <a:prstTxWarp prst="textNoShape">
+              <a:avLst/>
+            </a:prstTxWarp>
+          </a:bodyPr>
+          <a:lstStyle/>
+          <a:p>
+            <a:endParaRPr lang="en-US"/>
+          </a:p>
+        </p:txBody>
+      </p:sp>
+      <p:pic>
+        <p:nvPicPr>
+          <p:cNvPr id="1032" name="Picture 8" descr="https://lh5.googleusercontent.com/-9ZtfI7Iadbo/AAAAAAAAAAI/AAAAAAAAASM/pa_22SDQqFI/s120-c/photo.jpg"/>
+          <p:cNvPicPr>
+            <a:picLocks noChangeAspect="1" noChangeArrowheads="1"/>
+          </p:cNvPicPr>
+          <p:nvPr/>
+        </p:nvPicPr>
+        <p:blipFill>
+          <a:blip r:embed="rId5">
+            <a:extLst>
+              <a:ext uri="{28A0092B-C50C-407E-A947-70E740481C1C}">
+                <a14:useLocalDpi xmlns:a14="http://schemas.microsoft.com/office/drawing/2010/main" val="0"/>
+              </a:ext>
+            </a:extLst>
+          </a:blip>
+          <a:srcRect/>
+          <a:stretch>
+            <a:fillRect/>
+          </a:stretch>
+        </p:blipFill>
+        <p:spPr bwMode="auto">
+          <a:xfrm>
+            <a:off x="225538" y="620575"/>
+            <a:ext cx="720945" cy="720946"/>
+          </a:xfrm>
+          <a:prstGeom prst="rect">
+            <a:avLst/>
+          </a:prstGeom>
+          <a:noFill/>
+          <a:extLst>
+            <a:ext uri="{909E8E84-426E-40DD-AFC4-6F175D3DCCD1}">
+              <a14:hiddenFill xmlns:a14="http://schemas.microsoft.com/office/drawing/2010/main">
+                <a:solidFill>
+                  <a:srgbClr val="FFFFFF"/>
+                </a:solidFill>
+              </a14:hiddenFill>
+            </a:ext>
+          </a:extLst>
+        </p:spPr>
+      </p:pic>
+      <p:sp>
+        <p:nvSpPr>
+          <p:cNvPr id="10" name="Content Placeholder 6"/>
+          <p:cNvSpPr txBox="1">
+            <a:spLocks/>
+          </p:cNvSpPr>
+          <p:nvPr/>
+        </p:nvSpPr>
+        <p:spPr>
+          <a:xfrm>
+            <a:off x="8424110" y="4690945"/>
+            <a:ext cx="3082089" cy="1638417"/>
+          </a:xfrm>
+          <a:prstGeom prst="rect">
+            <a:avLst/>
+          </a:prstGeom>
+        </p:spPr>
+        <p:txBody>
+          <a:bodyPr vert="horz" lIns="91440" tIns="45720" rIns="91440" bIns="45720" rtlCol="0">
+            <a:normAutofit/>
+          </a:bodyPr>
+          <a:lstStyle>
+            <a:lvl1pPr marL="228600" indent="-228600" algn="l" defTabSz="914400" rtl="0" eaLnBrk="1" latinLnBrk="0" hangingPunct="1">
+              <a:lnSpc>
+                <a:spcPct val="90000"/>
+              </a:lnSpc>
+              <a:spcBef>
+                <a:spcPts val="1000"/>
+              </a:spcBef>
+              <a:buFont typeface="Arial" panose="020B0604020202020204" pitchFamily="34" charset="0"/>
+              <a:buChar char="•"/>
+              <a:defRPr sz="2800" kern="1200">
+                <a:solidFill>
+                  <a:schemeClr val="tx1"/>
+                </a:solidFill>
+                <a:latin typeface="+mn-lt"/>
+                <a:ea typeface="+mn-ea"/>
+                <a:cs typeface="+mn-cs"/>
+              </a:defRPr>
+            </a:lvl1pPr>
+            <a:lvl2pPr marL="685800" indent="-228600" algn="l" defTabSz="914400" rtl="0" eaLnBrk="1" latinLnBrk="0" hangingPunct="1">
+              <a:lnSpc>
+                <a:spcPct val="90000"/>
+              </a:lnSpc>
+              <a:spcBef>
+                <a:spcPts val="500"/>
+              </a:spcBef>
+              <a:buFont typeface="Arial" panose="020B0604020202020204" pitchFamily="34" charset="0"/>
+              <a:buChar char="•"/>
+              <a:defRPr sz="2400" kern="1200">
+                <a:solidFill>
+                  <a:schemeClr val="tx1"/>
+                </a:solidFill>
+                <a:latin typeface="+mn-lt"/>
+                <a:ea typeface="+mn-ea"/>
+                <a:cs typeface="+mn-cs"/>
+              </a:defRPr>
+            </a:lvl2pPr>
+            <a:lvl3pPr marL="1143000" indent="-228600" algn="l" defTabSz="914400" rtl="0" eaLnBrk="1" latinLnBrk="0" hangingPunct="1">
+              <a:lnSpc>
+                <a:spcPct val="90000"/>
+              </a:lnSpc>
+              <a:spcBef>
+                <a:spcPts val="500"/>
+              </a:spcBef>
+              <a:buFont typeface="Arial" panose="020B0604020202020204" pitchFamily="34" charset="0"/>
+              <a:buChar char="•"/>
+              <a:defRPr sz="2000" kern="1200">
+                <a:solidFill>
+                  <a:schemeClr val="tx1"/>
+                </a:solidFill>
+                <a:latin typeface="+mn-lt"/>
+                <a:ea typeface="+mn-ea"/>
+                <a:cs typeface="+mn-cs"/>
+              </a:defRPr>
+            </a:lvl3pPr>
+            <a:lvl4pPr marL="1600200" indent="-228600" algn="l" defTabSz="914400" rtl="0" eaLnBrk="1" latinLnBrk="0" hangingPunct="1">
+              <a:lnSpc>
+                <a:spcPct val="90000"/>
+              </a:lnSpc>
+              <a:spcBef>
+                <a:spcPts val="500"/>
+              </a:spcBef>
+              <a:buFont typeface="Arial" panose="020B0604020202020204" pitchFamily="34" charset="0"/>
+              <a:buChar char="•"/>
+              <a:defRPr sz="1800" kern="1200">
+                <a:solidFill>
+                  <a:schemeClr val="tx1"/>
+                </a:solidFill>
+                <a:latin typeface="+mn-lt"/>
+                <a:ea typeface="+mn-ea"/>
+                <a:cs typeface="+mn-cs"/>
+              </a:defRPr>
+            </a:lvl4pPr>
+            <a:lvl5pPr marL="2057400" indent="-228600" algn="l" defTabSz="914400" rtl="0" eaLnBrk="1" latinLnBrk="0" hangingPunct="1">
+              <a:lnSpc>
+                <a:spcPct val="90000"/>
+              </a:lnSpc>
+              <a:spcBef>
+                <a:spcPts val="500"/>
+              </a:spcBef>
+              <a:buFont typeface="Arial" panose="020B0604020202020204" pitchFamily="34" charset="0"/>
+              <a:buChar char="•"/>
+              <a:defRPr sz="1800" kern="1200">
+                <a:solidFill>
+                  <a:schemeClr val="tx1"/>
+                </a:solidFill>
+                <a:latin typeface="+mn-lt"/>
+                <a:ea typeface="+mn-ea"/>
+                <a:cs typeface="+mn-cs"/>
+              </a:defRPr>
+            </a:lvl5pPr>
+            <a:lvl6pPr marL="2514600" indent="-228600" algn="l" defTabSz="914400" rtl="0" eaLnBrk="1" latinLnBrk="0" hangingPunct="1">
+              <a:lnSpc>
+                <a:spcPct val="90000"/>
+              </a:lnSpc>
+              <a:spcBef>
+                <a:spcPts val="500"/>
+              </a:spcBef>
+              <a:buFont typeface="Arial" panose="020B0604020202020204" pitchFamily="34" charset="0"/>
+              <a:buChar char="•"/>
+              <a:defRPr sz="1800" kern="1200">
+                <a:solidFill>
+                  <a:schemeClr val="tx1"/>
+                </a:solidFill>
+                <a:latin typeface="+mn-lt"/>
+                <a:ea typeface="+mn-ea"/>
+                <a:cs typeface="+mn-cs"/>
+              </a:defRPr>
+            </a:lvl6pPr>
+            <a:lvl7pPr marL="2971800" indent="-228600" algn="l" defTabSz="914400" rtl="0" eaLnBrk="1" latinLnBrk="0" hangingPunct="1">
+              <a:lnSpc>
+                <a:spcPct val="90000"/>
+              </a:lnSpc>
+              <a:spcBef>
+                <a:spcPts val="500"/>
+              </a:spcBef>
+              <a:buFont typeface="Arial" panose="020B0604020202020204" pitchFamily="34" charset="0"/>
+              <a:buChar char="•"/>
+              <a:defRPr sz="1800" kern="1200">
+                <a:solidFill>
+                  <a:schemeClr val="tx1"/>
+                </a:solidFill>
+                <a:latin typeface="+mn-lt"/>
+                <a:ea typeface="+mn-ea"/>
+                <a:cs typeface="+mn-cs"/>
+              </a:defRPr>
+            </a:lvl7pPr>
+            <a:lvl8pPr marL="3429000" indent="-228600" algn="l" defTabSz="914400" rtl="0" eaLnBrk="1" latinLnBrk="0" hangingPunct="1">
+              <a:lnSpc>
+                <a:spcPct val="90000"/>
+              </a:lnSpc>
+              <a:spcBef>
+                <a:spcPts val="500"/>
+              </a:spcBef>
+              <a:buFont typeface="Arial" panose="020B0604020202020204" pitchFamily="34" charset="0"/>
+              <a:buChar char="•"/>
+              <a:defRPr sz="1800" kern="1200">
+                <a:solidFill>
+                  <a:schemeClr val="tx1"/>
+                </a:solidFill>
+                <a:latin typeface="+mn-lt"/>
+                <a:ea typeface="+mn-ea"/>
+                <a:cs typeface="+mn-cs"/>
+              </a:defRPr>
+            </a:lvl8pPr>
+            <a:lvl9pPr marL="3886200" indent="-228600" algn="l" defTabSz="914400" rtl="0" eaLnBrk="1" latinLnBrk="0" hangingPunct="1">
+              <a:lnSpc>
+                <a:spcPct val="90000"/>
+              </a:lnSpc>
+              <a:spcBef>
+                <a:spcPts val="500"/>
+              </a:spcBef>
+              <a:buFont typeface="Arial" panose="020B0604020202020204" pitchFamily="34" charset="0"/>
+              <a:buChar char="•"/>
+              <a:defRPr sz="1800" kern="1200">
+                <a:solidFill>
+                  <a:schemeClr val="tx1"/>
+                </a:solidFill>
+                <a:latin typeface="+mn-lt"/>
+                <a:ea typeface="+mn-ea"/>
+                <a:cs typeface="+mn-cs"/>
+              </a:defRPr>
+            </a:lvl9pPr>
+          </a:lstStyle>
+          <a:p>
+            <a:r>
+              <a:rPr lang="en-US" dirty="0" smtClean="0"/>
+              <a:t>Chris </a:t>
+            </a:r>
+            <a:r>
+              <a:rPr lang="en-US" dirty="0" err="1" smtClean="0"/>
+              <a:t>Evelo</a:t>
+            </a:r>
+            <a:endParaRPr lang="en-US" dirty="0"/>
+          </a:p>
+        </p:txBody>
+      </p:sp>
+      <p:sp>
+        <p:nvSpPr>
+          <p:cNvPr id="6" name="Rectangle 5"/>
+          <p:cNvSpPr/>
+          <p:nvPr/>
+        </p:nvSpPr>
+        <p:spPr>
+          <a:xfrm>
+            <a:off x="946483" y="4690945"/>
+            <a:ext cx="2549096" cy="830997"/>
+          </a:xfrm>
+          <a:prstGeom prst="rect">
+            <a:avLst/>
+          </a:prstGeom>
+        </p:spPr>
+        <p:txBody>
+          <a:bodyPr wrap="none">
+            <a:spAutoFit/>
+          </a:bodyPr>
+          <a:lstStyle/>
+          <a:p>
+            <a:r>
+              <a:rPr lang="en-US" sz="2400" b="1" smtClean="0"/>
+              <a:t>Data FAIRport</a:t>
+            </a:r>
+            <a:endParaRPr lang="en-US" sz="2400" b="1"/>
+          </a:p>
+          <a:p>
+            <a:pPr marL="342900" indent="-342900">
+              <a:buFont typeface="Arial" panose="020B0604020202020204" pitchFamily="34" charset="0"/>
+              <a:buChar char="•"/>
+            </a:pPr>
+            <a:r>
+              <a:rPr lang="en-US" sz="2400" b="1" smtClean="0"/>
+              <a:t>Mark Wilkinson</a:t>
+            </a:r>
+            <a:endParaRPr lang="en-US" sz="2400" b="1" dirty="0"/>
+          </a:p>
+        </p:txBody>
+      </p:sp>
     </p:spTree>
     <p:extLst>
       <p:ext uri="{BB962C8B-B14F-4D97-AF65-F5344CB8AC3E}">
@@ -6387,7 +6769,6 @@
               <a:rPr lang="en-US" sz="3600" dirty="0"/>
               <a:t>Diseases</a:t>
             </a:r>
-            <a:endParaRPr lang="en-US" sz="3600" dirty="0"/>
           </a:p>
           <a:p>
             <a:pPr algn="r"/>
@@ -6478,7 +6859,6 @@
               <a:rPr lang="en-US" dirty="0"/>
               <a:t>.</a:t>
             </a:r>
-            <a:endParaRPr lang="en-US" dirty="0"/>
           </a:p>
         </p:txBody>
       </p:sp>
@@ -6614,7 +6994,6 @@
               <a:rPr lang="en-US" dirty="0"/>
               <a:t>.</a:t>
             </a:r>
-            <a:endParaRPr lang="en-US" dirty="0"/>
           </a:p>
         </p:txBody>
       </p:sp>
@@ -6770,7 +7149,6 @@
               <a:rPr lang="en-US" dirty="0"/>
               <a:t>.</a:t>
             </a:r>
-            <a:endParaRPr lang="en-US" dirty="0"/>
           </a:p>
         </p:txBody>
       </p:sp>
@@ -6802,7 +7180,7 @@
         </p:nvCxnSpPr>
         <p:spPr>
           <a:xfrm>
-            <a:off x="4495801" y="152400"/>
+            <a:off x="4592443" y="903685"/>
             <a:ext cx="1676433" cy="381000"/>
           </a:xfrm>
           <a:prstGeom prst="line">
@@ -6837,7 +7215,7 @@
         </p:nvSpPr>
         <p:spPr>
           <a:xfrm>
-            <a:off x="4466079" y="609601"/>
+            <a:off x="4400571" y="293907"/>
             <a:ext cx="2060179" cy="584775"/>
           </a:xfrm>
           <a:prstGeom prst="rect">
@@ -6861,13 +7239,6 @@
               </a:rPr>
               <a:t>knowledge</a:t>
             </a:r>
-            <a:endParaRPr lang="en-US" sz="3200" b="1" dirty="0">
-              <a:solidFill>
-                <a:srgbClr val="FF0000"/>
-              </a:solidFill>
-              <a:latin typeface="MV Boli" panose="02000500030200090000" pitchFamily="2" charset="0"/>
-              <a:cs typeface="MV Boli" panose="02000500030200090000" pitchFamily="2" charset="0"/>
-            </a:endParaRPr>
           </a:p>
         </p:txBody>
       </p:sp>
@@ -6943,13 +7314,13 @@
         </p:nvSpPr>
         <p:spPr>
           <a:xfrm>
-            <a:off x="2209800" y="1143000"/>
-            <a:ext cx="7924800" cy="4648200"/>
+            <a:off x="2209800" y="2036956"/>
+            <a:ext cx="7924800" cy="3754244"/>
           </a:xfrm>
         </p:spPr>
         <p:txBody>
           <a:bodyPr>
-            <a:normAutofit fontScale="92500" lnSpcReduction="20000"/>
+            <a:normAutofit fontScale="70000" lnSpcReduction="20000"/>
           </a:bodyPr>
           <a:lstStyle/>
           <a:p>
@@ -7017,7 +7388,6 @@
               <a:rPr lang="en-US" dirty="0"/>
               <a:t>…</a:t>
             </a:r>
-            <a:endParaRPr lang="en-US" dirty="0"/>
           </a:p>
         </p:txBody>
       </p:sp>

</xml_diff>